<commit_message>
Report - most chapters, mainly lessons learned
</commit_message>
<xml_diff>
--- a/ProjectReport/img/Architecture_v1.pptx
+++ b/ProjectReport/img/Architecture_v1.pptx
@@ -256,7 +256,7 @@
           <a:p>
             <a:fld id="{255773D3-74C1-4A48-BCF5-4DD3F045BF55}" type="datetimeFigureOut">
               <a:rPr lang="en-US" smtClean="0"/>
-              <a:t>11/27/2016</a:t>
+              <a:t>11/29/2016</a:t>
             </a:fld>
             <a:endParaRPr lang="en-US"/>
           </a:p>
@@ -426,7 +426,7 @@
           <a:p>
             <a:fld id="{255773D3-74C1-4A48-BCF5-4DD3F045BF55}" type="datetimeFigureOut">
               <a:rPr lang="en-US" smtClean="0"/>
-              <a:t>11/27/2016</a:t>
+              <a:t>11/29/2016</a:t>
             </a:fld>
             <a:endParaRPr lang="en-US"/>
           </a:p>
@@ -606,7 +606,7 @@
           <a:p>
             <a:fld id="{255773D3-74C1-4A48-BCF5-4DD3F045BF55}" type="datetimeFigureOut">
               <a:rPr lang="en-US" smtClean="0"/>
-              <a:t>11/27/2016</a:t>
+              <a:t>11/29/2016</a:t>
             </a:fld>
             <a:endParaRPr lang="en-US"/>
           </a:p>
@@ -776,7 +776,7 @@
           <a:p>
             <a:fld id="{255773D3-74C1-4A48-BCF5-4DD3F045BF55}" type="datetimeFigureOut">
               <a:rPr lang="en-US" smtClean="0"/>
-              <a:t>11/27/2016</a:t>
+              <a:t>11/29/2016</a:t>
             </a:fld>
             <a:endParaRPr lang="en-US"/>
           </a:p>
@@ -1022,7 +1022,7 @@
           <a:p>
             <a:fld id="{255773D3-74C1-4A48-BCF5-4DD3F045BF55}" type="datetimeFigureOut">
               <a:rPr lang="en-US" smtClean="0"/>
-              <a:t>11/27/2016</a:t>
+              <a:t>11/29/2016</a:t>
             </a:fld>
             <a:endParaRPr lang="en-US"/>
           </a:p>
@@ -1254,7 +1254,7 @@
           <a:p>
             <a:fld id="{255773D3-74C1-4A48-BCF5-4DD3F045BF55}" type="datetimeFigureOut">
               <a:rPr lang="en-US" smtClean="0"/>
-              <a:t>11/27/2016</a:t>
+              <a:t>11/29/2016</a:t>
             </a:fld>
             <a:endParaRPr lang="en-US"/>
           </a:p>
@@ -1621,7 +1621,7 @@
           <a:p>
             <a:fld id="{255773D3-74C1-4A48-BCF5-4DD3F045BF55}" type="datetimeFigureOut">
               <a:rPr lang="en-US" smtClean="0"/>
-              <a:t>11/27/2016</a:t>
+              <a:t>11/29/2016</a:t>
             </a:fld>
             <a:endParaRPr lang="en-US"/>
           </a:p>
@@ -1739,7 +1739,7 @@
           <a:p>
             <a:fld id="{255773D3-74C1-4A48-BCF5-4DD3F045BF55}" type="datetimeFigureOut">
               <a:rPr lang="en-US" smtClean="0"/>
-              <a:t>11/27/2016</a:t>
+              <a:t>11/29/2016</a:t>
             </a:fld>
             <a:endParaRPr lang="en-US"/>
           </a:p>
@@ -1834,7 +1834,7 @@
           <a:p>
             <a:fld id="{255773D3-74C1-4A48-BCF5-4DD3F045BF55}" type="datetimeFigureOut">
               <a:rPr lang="en-US" smtClean="0"/>
-              <a:t>11/27/2016</a:t>
+              <a:t>11/29/2016</a:t>
             </a:fld>
             <a:endParaRPr lang="en-US"/>
           </a:p>
@@ -2111,7 +2111,7 @@
           <a:p>
             <a:fld id="{255773D3-74C1-4A48-BCF5-4DD3F045BF55}" type="datetimeFigureOut">
               <a:rPr lang="en-US" smtClean="0"/>
-              <a:t>11/27/2016</a:t>
+              <a:t>11/29/2016</a:t>
             </a:fld>
             <a:endParaRPr lang="en-US"/>
           </a:p>
@@ -2364,7 +2364,7 @@
           <a:p>
             <a:fld id="{255773D3-74C1-4A48-BCF5-4DD3F045BF55}" type="datetimeFigureOut">
               <a:rPr lang="en-US" smtClean="0"/>
-              <a:t>11/27/2016</a:t>
+              <a:t>11/29/2016</a:t>
             </a:fld>
             <a:endParaRPr lang="en-US"/>
           </a:p>
@@ -2577,7 +2577,7 @@
           <a:p>
             <a:fld id="{255773D3-74C1-4A48-BCF5-4DD3F045BF55}" type="datetimeFigureOut">
               <a:rPr lang="en-US" smtClean="0"/>
-              <a:t>11/27/2016</a:t>
+              <a:t>11/29/2016</a:t>
             </a:fld>
             <a:endParaRPr lang="en-US"/>
           </a:p>
@@ -6086,7 +6086,7 @@
         </p:nvSpPr>
         <p:spPr>
           <a:xfrm>
-            <a:off x="7728650" y="966002"/>
+            <a:off x="7728649" y="966002"/>
             <a:ext cx="3885745" cy="4777507"/>
           </a:xfrm>
           <a:prstGeom prst="roundRect">
@@ -6301,7 +6301,7 @@
         </p:nvSpPr>
         <p:spPr>
           <a:xfrm>
-            <a:off x="8872525" y="5411452"/>
+            <a:off x="8861859" y="5411452"/>
             <a:ext cx="1619327" cy="483807"/>
           </a:xfrm>
           <a:prstGeom prst="rect">
@@ -6747,7 +6747,7 @@
         </p:nvSpPr>
         <p:spPr>
           <a:xfrm>
-            <a:off x="9009192" y="3109733"/>
+            <a:off x="9002963" y="3891345"/>
             <a:ext cx="1336964" cy="643764"/>
           </a:xfrm>
           <a:prstGeom prst="rect">
@@ -6800,14 +6800,14 @@
           <p:cNvCxnSpPr>
             <a:cxnSpLocks/>
             <a:stCxn id="172" idx="1"/>
-            <a:endCxn id="179" idx="3"/>
+            <a:endCxn id="77" idx="4"/>
           </p:cNvCxnSpPr>
           <p:nvPr/>
         </p:nvCxnSpPr>
         <p:spPr>
           <a:xfrm rot="10800000">
-            <a:off x="10346156" y="3431616"/>
-            <a:ext cx="207334" cy="1635"/>
+            <a:off x="10244944" y="3432862"/>
+            <a:ext cx="308547" cy="389"/>
           </a:xfrm>
           <a:prstGeom prst="bentConnector3">
             <a:avLst>
@@ -6842,8 +6842,8 @@
         </p:nvSpPr>
         <p:spPr>
           <a:xfrm>
-            <a:off x="9132429" y="4234478"/>
-            <a:ext cx="1100593" cy="609888"/>
+            <a:off x="8820989" y="4772634"/>
+            <a:ext cx="1700912" cy="424330"/>
           </a:xfrm>
           <a:prstGeom prst="flowChartMagneticDisk">
             <a:avLst/>
@@ -6905,46 +6905,6 @@
       </p:sp>
       <p:cxnSp>
         <p:nvCxnSpPr>
-          <p:cNvPr id="191" name="Gewinkelte Verbindung 14"/>
-          <p:cNvCxnSpPr>
-            <a:cxnSpLocks/>
-            <a:stCxn id="184" idx="3"/>
-            <a:endCxn id="146" idx="0"/>
-          </p:cNvCxnSpPr>
-          <p:nvPr/>
-        </p:nvCxnSpPr>
-        <p:spPr>
-          <a:xfrm rot="5400000">
-            <a:off x="9398915" y="5127641"/>
-            <a:ext cx="567086" cy="537"/>
-          </a:xfrm>
-          <a:prstGeom prst="bentConnector3">
-            <a:avLst>
-              <a:gd name="adj1" fmla="val 50000"/>
-            </a:avLst>
-          </a:prstGeom>
-          <a:ln>
-            <a:headEnd type="none" w="med" len="med"/>
-            <a:tailEnd type="triangle" w="med" len="med"/>
-          </a:ln>
-        </p:spPr>
-        <p:style>
-          <a:lnRef idx="3">
-            <a:schemeClr val="dk1"/>
-          </a:lnRef>
-          <a:fillRef idx="0">
-            <a:schemeClr val="dk1"/>
-          </a:fillRef>
-          <a:effectRef idx="2">
-            <a:schemeClr val="dk1"/>
-          </a:effectRef>
-          <a:fontRef idx="minor">
-            <a:schemeClr val="tx1"/>
-          </a:fontRef>
-        </p:style>
-      </p:cxnSp>
-      <p:cxnSp>
-        <p:nvCxnSpPr>
           <p:cNvPr id="211" name="Gerade Verbindung mit Pfeil 210"/>
           <p:cNvCxnSpPr>
             <a:cxnSpLocks/>
@@ -6954,7 +6914,7 @@
         </p:nvCxnSpPr>
         <p:spPr>
           <a:xfrm flipH="1">
-            <a:off x="9679310" y="5895259"/>
+            <a:off x="9668644" y="5895259"/>
             <a:ext cx="2879" cy="434494"/>
           </a:xfrm>
           <a:prstGeom prst="straightConnector1">
@@ -7058,13 +7018,189 @@
         </p:nvCxnSpPr>
         <p:spPr>
           <a:xfrm>
-            <a:off x="9677674" y="3753497"/>
-            <a:ext cx="5052" cy="480981"/>
+            <a:off x="9671445" y="4535109"/>
+            <a:ext cx="0" cy="237525"/>
           </a:xfrm>
           <a:prstGeom prst="straightConnector1">
             <a:avLst/>
           </a:prstGeom>
           <a:ln>
+            <a:headEnd type="none" w="med" len="med"/>
+            <a:tailEnd type="triangle" w="med" len="med"/>
+          </a:ln>
+        </p:spPr>
+        <p:style>
+          <a:lnRef idx="3">
+            <a:schemeClr val="dk1"/>
+          </a:lnRef>
+          <a:fillRef idx="0">
+            <a:schemeClr val="dk1"/>
+          </a:fillRef>
+          <a:effectRef idx="2">
+            <a:schemeClr val="dk1"/>
+          </a:effectRef>
+          <a:fontRef idx="minor">
+            <a:schemeClr val="tx1"/>
+          </a:fontRef>
+        </p:style>
+      </p:cxnSp>
+      <p:cxnSp>
+        <p:nvCxnSpPr>
+          <p:cNvPr id="58" name="Gerade Verbindung mit Pfeil 57"/>
+          <p:cNvCxnSpPr>
+            <a:cxnSpLocks/>
+            <a:stCxn id="184" idx="3"/>
+            <a:endCxn id="146" idx="0"/>
+          </p:cNvCxnSpPr>
+          <p:nvPr/>
+        </p:nvCxnSpPr>
+        <p:spPr>
+          <a:xfrm>
+            <a:off x="9671445" y="5196964"/>
+            <a:ext cx="78" cy="214488"/>
+          </a:xfrm>
+          <a:prstGeom prst="straightConnector1">
+            <a:avLst/>
+          </a:prstGeom>
+          <a:ln>
+            <a:headEnd type="none" w="med" len="med"/>
+            <a:tailEnd type="triangle" w="med" len="med"/>
+          </a:ln>
+        </p:spPr>
+        <p:style>
+          <a:lnRef idx="3">
+            <a:schemeClr val="dk1"/>
+          </a:lnRef>
+          <a:fillRef idx="0">
+            <a:schemeClr val="dk1"/>
+          </a:fillRef>
+          <a:effectRef idx="2">
+            <a:schemeClr val="dk1"/>
+          </a:effectRef>
+          <a:fontRef idx="minor">
+            <a:schemeClr val="tx1"/>
+          </a:fontRef>
+        </p:style>
+      </p:cxnSp>
+      <p:cxnSp>
+        <p:nvCxnSpPr>
+          <p:cNvPr id="72" name="Gerade Verbindung mit Pfeil 71"/>
+          <p:cNvCxnSpPr>
+            <a:cxnSpLocks/>
+            <a:stCxn id="77" idx="3"/>
+            <a:endCxn id="179" idx="0"/>
+          </p:cNvCxnSpPr>
+          <p:nvPr/>
+        </p:nvCxnSpPr>
+        <p:spPr>
+          <a:xfrm>
+            <a:off x="9671445" y="3645026"/>
+            <a:ext cx="0" cy="246319"/>
+          </a:xfrm>
+          <a:prstGeom prst="straightConnector1">
+            <a:avLst/>
+          </a:prstGeom>
+          <a:ln>
+            <a:headEnd type="none" w="med" len="med"/>
+            <a:tailEnd type="triangle" w="med" len="med"/>
+          </a:ln>
+        </p:spPr>
+        <p:style>
+          <a:lnRef idx="3">
+            <a:schemeClr val="dk1"/>
+          </a:lnRef>
+          <a:fillRef idx="0">
+            <a:schemeClr val="dk1"/>
+          </a:fillRef>
+          <a:effectRef idx="2">
+            <a:schemeClr val="dk1"/>
+          </a:effectRef>
+          <a:fontRef idx="minor">
+            <a:schemeClr val="tx1"/>
+          </a:fontRef>
+        </p:style>
+      </p:cxnSp>
+      <p:sp>
+        <p:nvSpPr>
+          <p:cNvPr id="77" name="Flussdiagramm: Magnetplattenspeicher 76"/>
+          <p:cNvSpPr/>
+          <p:nvPr/>
+        </p:nvSpPr>
+        <p:spPr>
+          <a:xfrm>
+            <a:off x="9097947" y="3220696"/>
+            <a:ext cx="1146996" cy="424330"/>
+          </a:xfrm>
+          <a:prstGeom prst="flowChartMagneticDisk">
+            <a:avLst/>
+          </a:prstGeom>
+          <a:solidFill>
+            <a:schemeClr val="accent1">
+              <a:lumMod val="60000"/>
+              <a:lumOff val="40000"/>
+            </a:schemeClr>
+          </a:solidFill>
+          <a:ln>
+            <a:noFill/>
+          </a:ln>
+        </p:spPr>
+        <p:style>
+          <a:lnRef idx="2">
+            <a:schemeClr val="accent1">
+              <a:shade val="50000"/>
+            </a:schemeClr>
+          </a:lnRef>
+          <a:fillRef idx="1">
+            <a:schemeClr val="accent1"/>
+          </a:fillRef>
+          <a:effectRef idx="0">
+            <a:schemeClr val="accent1"/>
+          </a:effectRef>
+          <a:fontRef idx="minor">
+            <a:schemeClr val="lt1"/>
+          </a:fontRef>
+        </p:style>
+        <p:txBody>
+          <a:bodyPr rtlCol="0" anchor="ctr"/>
+          <a:lstStyle/>
+          <a:p>
+            <a:pPr algn="ctr"/>
+            <a:r>
+              <a:rPr lang="de-DE" dirty="0">
+                <a:solidFill>
+                  <a:schemeClr val="tx1"/>
+                </a:solidFill>
+              </a:rPr>
+              <a:t>URI Cache</a:t>
+            </a:r>
+            <a:endParaRPr lang="en-US" dirty="0">
+              <a:solidFill>
+                <a:schemeClr val="tx1"/>
+              </a:solidFill>
+            </a:endParaRPr>
+          </a:p>
+        </p:txBody>
+      </p:sp>
+      <p:cxnSp>
+        <p:nvCxnSpPr>
+          <p:cNvPr id="93" name="Gewinkelte Verbindung 14"/>
+          <p:cNvCxnSpPr>
+            <a:cxnSpLocks/>
+            <a:stCxn id="140" idx="2"/>
+            <a:endCxn id="77" idx="2"/>
+          </p:cNvCxnSpPr>
+          <p:nvPr/>
+        </p:nvCxnSpPr>
+        <p:spPr>
+          <a:xfrm rot="16200000" flipH="1">
+            <a:off x="7669563" y="2004477"/>
+            <a:ext cx="2194106" cy="662661"/>
+          </a:xfrm>
+          <a:prstGeom prst="bentConnector2">
+            <a:avLst/>
+          </a:prstGeom>
+          <a:ln>
+            <a:prstDash val="dash"/>
             <a:headEnd type="none" w="med" len="med"/>
             <a:tailEnd type="triangle" w="med" len="med"/>
           </a:ln>

</xml_diff>